<commit_message>
스튜던트 t 테스트 / pic3 upload
</commit_message>
<xml_diff>
--- a/pics/2020-02-13-Students_t_test/pics.pptx
+++ b/pics/2020-02-13-Students_t_test/pics.pptx
@@ -7,6 +7,7 @@
   <p:sldIdLst>
     <p:sldId id="256" r:id="rId2"/>
     <p:sldId id="257" r:id="rId3"/>
+    <p:sldId id="258" r:id="rId4"/>
   </p:sldIdLst>
   <p:sldSz cx="9144000" cy="6858000" type="screen4x3"/>
   <p:notesSz cx="6858000" cy="9144000"/>
@@ -105,6 +106,11 @@
       </a:defRPr>
     </a:lvl9pPr>
   </p:defaultTextStyle>
+  <p:extLst>
+    <p:ext uri="{EFAFB233-063F-42B5-8137-9DF3F51BA10A}">
+      <p15:sldGuideLst xmlns:p15="http://schemas.microsoft.com/office/powerpoint/2012/main"/>
+    </p:ext>
+  </p:extLst>
 </p:presentation>
 </file>
 
@@ -239,7 +245,7 @@
           <a:p>
             <a:fld id="{63BD1D83-48CC-42D0-AB36-0F80C9FDD5DB}" type="datetimeFigureOut">
               <a:rPr lang="ko-KR" altLang="en-US" smtClean="0"/>
-              <a:t>2020-02-13</a:t>
+              <a:t>2020-02-14</a:t>
             </a:fld>
             <a:endParaRPr lang="ko-KR" altLang="en-US"/>
           </a:p>
@@ -409,7 +415,7 @@
           <a:p>
             <a:fld id="{63BD1D83-48CC-42D0-AB36-0F80C9FDD5DB}" type="datetimeFigureOut">
               <a:rPr lang="ko-KR" altLang="en-US" smtClean="0"/>
-              <a:t>2020-02-13</a:t>
+              <a:t>2020-02-14</a:t>
             </a:fld>
             <a:endParaRPr lang="ko-KR" altLang="en-US"/>
           </a:p>
@@ -589,7 +595,7 @@
           <a:p>
             <a:fld id="{63BD1D83-48CC-42D0-AB36-0F80C9FDD5DB}" type="datetimeFigureOut">
               <a:rPr lang="ko-KR" altLang="en-US" smtClean="0"/>
-              <a:t>2020-02-13</a:t>
+              <a:t>2020-02-14</a:t>
             </a:fld>
             <a:endParaRPr lang="ko-KR" altLang="en-US"/>
           </a:p>
@@ -759,7 +765,7 @@
           <a:p>
             <a:fld id="{63BD1D83-48CC-42D0-AB36-0F80C9FDD5DB}" type="datetimeFigureOut">
               <a:rPr lang="ko-KR" altLang="en-US" smtClean="0"/>
-              <a:t>2020-02-13</a:t>
+              <a:t>2020-02-14</a:t>
             </a:fld>
             <a:endParaRPr lang="ko-KR" altLang="en-US"/>
           </a:p>
@@ -1003,7 +1009,7 @@
           <a:p>
             <a:fld id="{63BD1D83-48CC-42D0-AB36-0F80C9FDD5DB}" type="datetimeFigureOut">
               <a:rPr lang="ko-KR" altLang="en-US" smtClean="0"/>
-              <a:t>2020-02-13</a:t>
+              <a:t>2020-02-14</a:t>
             </a:fld>
             <a:endParaRPr lang="ko-KR" altLang="en-US"/>
           </a:p>
@@ -1235,7 +1241,7 @@
           <a:p>
             <a:fld id="{63BD1D83-48CC-42D0-AB36-0F80C9FDD5DB}" type="datetimeFigureOut">
               <a:rPr lang="ko-KR" altLang="en-US" smtClean="0"/>
-              <a:t>2020-02-13</a:t>
+              <a:t>2020-02-14</a:t>
             </a:fld>
             <a:endParaRPr lang="ko-KR" altLang="en-US"/>
           </a:p>
@@ -1602,7 +1608,7 @@
           <a:p>
             <a:fld id="{63BD1D83-48CC-42D0-AB36-0F80C9FDD5DB}" type="datetimeFigureOut">
               <a:rPr lang="ko-KR" altLang="en-US" smtClean="0"/>
-              <a:t>2020-02-13</a:t>
+              <a:t>2020-02-14</a:t>
             </a:fld>
             <a:endParaRPr lang="ko-KR" altLang="en-US"/>
           </a:p>
@@ -1720,7 +1726,7 @@
           <a:p>
             <a:fld id="{63BD1D83-48CC-42D0-AB36-0F80C9FDD5DB}" type="datetimeFigureOut">
               <a:rPr lang="ko-KR" altLang="en-US" smtClean="0"/>
-              <a:t>2020-02-13</a:t>
+              <a:t>2020-02-14</a:t>
             </a:fld>
             <a:endParaRPr lang="ko-KR" altLang="en-US"/>
           </a:p>
@@ -1815,7 +1821,7 @@
           <a:p>
             <a:fld id="{63BD1D83-48CC-42D0-AB36-0F80C9FDD5DB}" type="datetimeFigureOut">
               <a:rPr lang="ko-KR" altLang="en-US" smtClean="0"/>
-              <a:t>2020-02-13</a:t>
+              <a:t>2020-02-14</a:t>
             </a:fld>
             <a:endParaRPr lang="ko-KR" altLang="en-US"/>
           </a:p>
@@ -2092,7 +2098,7 @@
           <a:p>
             <a:fld id="{63BD1D83-48CC-42D0-AB36-0F80C9FDD5DB}" type="datetimeFigureOut">
               <a:rPr lang="ko-KR" altLang="en-US" smtClean="0"/>
-              <a:t>2020-02-13</a:t>
+              <a:t>2020-02-14</a:t>
             </a:fld>
             <a:endParaRPr lang="ko-KR" altLang="en-US"/>
           </a:p>
@@ -2349,7 +2355,7 @@
           <a:p>
             <a:fld id="{63BD1D83-48CC-42D0-AB36-0F80C9FDD5DB}" type="datetimeFigureOut">
               <a:rPr lang="ko-KR" altLang="en-US" smtClean="0"/>
-              <a:t>2020-02-13</a:t>
+              <a:t>2020-02-14</a:t>
             </a:fld>
             <a:endParaRPr lang="ko-KR" altLang="en-US"/>
           </a:p>
@@ -2562,7 +2568,7 @@
           <a:p>
             <a:fld id="{63BD1D83-48CC-42D0-AB36-0F80C9FDD5DB}" type="datetimeFigureOut">
               <a:rPr lang="ko-KR" altLang="en-US" smtClean="0"/>
-              <a:t>2020-02-13</a:t>
+              <a:t>2020-02-14</a:t>
             </a:fld>
             <a:endParaRPr lang="ko-KR" altLang="en-US"/>
           </a:p>
@@ -3242,6 +3248,602 @@
 </p:sld>
 </file>
 
+<file path=ppt/slides/slide3.xml><?xml version="1.0" encoding="utf-8"?>
+<p:sld xmlns:a="http://schemas.openxmlformats.org/drawingml/2006/main" xmlns:r="http://schemas.openxmlformats.org/officeDocument/2006/relationships" xmlns:p="http://schemas.openxmlformats.org/presentationml/2006/main">
+  <p:cSld>
+    <p:spTree>
+      <p:nvGrpSpPr>
+        <p:cNvPr id="1" name=""/>
+        <p:cNvGrpSpPr/>
+        <p:nvPr/>
+      </p:nvGrpSpPr>
+      <p:grpSpPr>
+        <a:xfrm>
+          <a:off x="0" y="0"/>
+          <a:ext cx="0" cy="0"/>
+          <a:chOff x="0" y="0"/>
+          <a:chExt cx="0" cy="0"/>
+        </a:xfrm>
+      </p:grpSpPr>
+      <p:pic>
+        <p:nvPicPr>
+          <p:cNvPr id="4" name="그림 3">
+            <a:extLst>
+              <a:ext uri="{FF2B5EF4-FFF2-40B4-BE49-F238E27FC236}">
+                <a16:creationId xmlns:a16="http://schemas.microsoft.com/office/drawing/2014/main" id="{0533B0AA-0351-4C02-A827-3895DDD21EAE}"/>
+              </a:ext>
+            </a:extLst>
+          </p:cNvPr>
+          <p:cNvPicPr>
+            <a:picLocks noChangeAspect="1"/>
+          </p:cNvPicPr>
+          <p:nvPr/>
+        </p:nvPicPr>
+        <p:blipFill>
+          <a:blip r:embed="rId2"/>
+          <a:stretch>
+            <a:fillRect/>
+          </a:stretch>
+        </p:blipFill>
+        <p:spPr>
+          <a:xfrm>
+            <a:off x="2393250" y="1428602"/>
+            <a:ext cx="4357501" cy="1692600"/>
+          </a:xfrm>
+          <a:prstGeom prst="rect">
+            <a:avLst/>
+          </a:prstGeom>
+        </p:spPr>
+      </p:pic>
+      <p:pic>
+        <p:nvPicPr>
+          <p:cNvPr id="5" name="그림 4">
+            <a:extLst>
+              <a:ext uri="{FF2B5EF4-FFF2-40B4-BE49-F238E27FC236}">
+                <a16:creationId xmlns:a16="http://schemas.microsoft.com/office/drawing/2014/main" id="{E24B7E91-F634-412D-8461-3A9785EFADAF}"/>
+              </a:ext>
+            </a:extLst>
+          </p:cNvPr>
+          <p:cNvPicPr>
+            <a:picLocks noChangeAspect="1"/>
+          </p:cNvPicPr>
+          <p:nvPr/>
+        </p:nvPicPr>
+        <p:blipFill>
+          <a:blip r:embed="rId3"/>
+          <a:stretch>
+            <a:fillRect/>
+          </a:stretch>
+        </p:blipFill>
+        <p:spPr>
+          <a:xfrm>
+            <a:off x="339930" y="3736798"/>
+            <a:ext cx="4357501" cy="1692600"/>
+          </a:xfrm>
+          <a:prstGeom prst="rect">
+            <a:avLst/>
+          </a:prstGeom>
+        </p:spPr>
+      </p:pic>
+      <p:pic>
+        <p:nvPicPr>
+          <p:cNvPr id="6" name="그림 5">
+            <a:extLst>
+              <a:ext uri="{FF2B5EF4-FFF2-40B4-BE49-F238E27FC236}">
+                <a16:creationId xmlns:a16="http://schemas.microsoft.com/office/drawing/2014/main" id="{F22CC3D1-B689-4B68-A8B7-6FC92023960B}"/>
+              </a:ext>
+            </a:extLst>
+          </p:cNvPr>
+          <p:cNvPicPr>
+            <a:picLocks noChangeAspect="1"/>
+          </p:cNvPicPr>
+          <p:nvPr/>
+        </p:nvPicPr>
+        <p:blipFill>
+          <a:blip r:embed="rId4"/>
+          <a:stretch>
+            <a:fillRect/>
+          </a:stretch>
+        </p:blipFill>
+        <p:spPr>
+          <a:xfrm>
+            <a:off x="4446570" y="3736798"/>
+            <a:ext cx="4357501" cy="1692600"/>
+          </a:xfrm>
+          <a:prstGeom prst="rect">
+            <a:avLst/>
+          </a:prstGeom>
+        </p:spPr>
+      </p:pic>
+      <p:cxnSp>
+        <p:nvCxnSpPr>
+          <p:cNvPr id="8" name="직선 화살표 연결선 7">
+            <a:extLst>
+              <a:ext uri="{FF2B5EF4-FFF2-40B4-BE49-F238E27FC236}">
+                <a16:creationId xmlns:a16="http://schemas.microsoft.com/office/drawing/2014/main" id="{8B1684DA-73CB-4EFF-8850-42EF19BA3B20}"/>
+              </a:ext>
+            </a:extLst>
+          </p:cNvPr>
+          <p:cNvCxnSpPr>
+            <a:cxnSpLocks/>
+          </p:cNvCxnSpPr>
+          <p:nvPr/>
+        </p:nvCxnSpPr>
+        <p:spPr>
+          <a:xfrm>
+            <a:off x="1880235" y="3979488"/>
+            <a:ext cx="1228725" cy="0"/>
+          </a:xfrm>
+          <a:prstGeom prst="straightConnector1">
+            <a:avLst/>
+          </a:prstGeom>
+          <a:ln w="38100">
+            <a:solidFill>
+              <a:srgbClr val="FF0000"/>
+            </a:solidFill>
+            <a:headEnd type="triangle" w="med" len="med"/>
+            <a:tailEnd type="triangle" w="med" len="med"/>
+          </a:ln>
+        </p:spPr>
+        <p:style>
+          <a:lnRef idx="1">
+            <a:schemeClr val="accent1"/>
+          </a:lnRef>
+          <a:fillRef idx="0">
+            <a:schemeClr val="accent1"/>
+          </a:fillRef>
+          <a:effectRef idx="0">
+            <a:schemeClr val="accent1"/>
+          </a:effectRef>
+          <a:fontRef idx="minor">
+            <a:schemeClr val="tx1"/>
+          </a:fontRef>
+        </p:style>
+      </p:cxnSp>
+      <p:sp>
+        <p:nvSpPr>
+          <p:cNvPr id="9" name="TextBox 8">
+            <a:extLst>
+              <a:ext uri="{FF2B5EF4-FFF2-40B4-BE49-F238E27FC236}">
+                <a16:creationId xmlns:a16="http://schemas.microsoft.com/office/drawing/2014/main" id="{37B6DBFF-9D9F-408C-B925-AE25DAA391FD}"/>
+              </a:ext>
+            </a:extLst>
+          </p:cNvPr>
+          <p:cNvSpPr txBox="1"/>
+          <p:nvPr/>
+        </p:nvSpPr>
+        <p:spPr>
+          <a:xfrm>
+            <a:off x="435609" y="3353695"/>
+            <a:ext cx="1444626" cy="369332"/>
+          </a:xfrm>
+          <a:prstGeom prst="rect">
+            <a:avLst/>
+          </a:prstGeom>
+          <a:solidFill>
+            <a:schemeClr val="bg1"/>
+          </a:solidFill>
+          <a:ln w="28575">
+            <a:solidFill>
+              <a:srgbClr val="FF0000"/>
+            </a:solidFill>
+          </a:ln>
+        </p:spPr>
+        <p:txBody>
+          <a:bodyPr wrap="none" rtlCol="0">
+            <a:spAutoFit/>
+          </a:bodyPr>
+          <a:lstStyle/>
+          <a:p>
+            <a:r>
+              <a:rPr lang="ko-KR" altLang="en-US" dirty="0"/>
+              <a:t>그룹 간 편차</a:t>
+            </a:r>
+          </a:p>
+        </p:txBody>
+      </p:sp>
+      <p:cxnSp>
+        <p:nvCxnSpPr>
+          <p:cNvPr id="14" name="직선 화살표 연결선 13">
+            <a:extLst>
+              <a:ext uri="{FF2B5EF4-FFF2-40B4-BE49-F238E27FC236}">
+                <a16:creationId xmlns:a16="http://schemas.microsoft.com/office/drawing/2014/main" id="{9C12A2FF-CCCC-4625-83CB-97D0AA8A23EB}"/>
+              </a:ext>
+            </a:extLst>
+          </p:cNvPr>
+          <p:cNvCxnSpPr>
+            <a:cxnSpLocks/>
+          </p:cNvCxnSpPr>
+          <p:nvPr/>
+        </p:nvCxnSpPr>
+        <p:spPr>
+          <a:xfrm>
+            <a:off x="6827324" y="4955775"/>
+            <a:ext cx="342715" cy="0"/>
+          </a:xfrm>
+          <a:prstGeom prst="straightConnector1">
+            <a:avLst/>
+          </a:prstGeom>
+          <a:ln w="38100">
+            <a:solidFill>
+              <a:schemeClr val="accent6"/>
+            </a:solidFill>
+            <a:headEnd type="triangle" w="med" len="med"/>
+            <a:tailEnd type="triangle" w="med" len="med"/>
+          </a:ln>
+        </p:spPr>
+        <p:style>
+          <a:lnRef idx="1">
+            <a:schemeClr val="accent1"/>
+          </a:lnRef>
+          <a:fillRef idx="0">
+            <a:schemeClr val="accent1"/>
+          </a:fillRef>
+          <a:effectRef idx="0">
+            <a:schemeClr val="accent1"/>
+          </a:effectRef>
+          <a:fontRef idx="minor">
+            <a:schemeClr val="tx1"/>
+          </a:fontRef>
+        </p:style>
+      </p:cxnSp>
+      <p:sp>
+        <p:nvSpPr>
+          <p:cNvPr id="15" name="TextBox 14">
+            <a:extLst>
+              <a:ext uri="{FF2B5EF4-FFF2-40B4-BE49-F238E27FC236}">
+                <a16:creationId xmlns:a16="http://schemas.microsoft.com/office/drawing/2014/main" id="{787D2902-7776-4E9D-B507-B6A38135D64A}"/>
+              </a:ext>
+            </a:extLst>
+          </p:cNvPr>
+          <p:cNvSpPr txBox="1"/>
+          <p:nvPr/>
+        </p:nvSpPr>
+        <p:spPr>
+          <a:xfrm>
+            <a:off x="7249938" y="4398432"/>
+            <a:ext cx="1444626" cy="369332"/>
+          </a:xfrm>
+          <a:prstGeom prst="rect">
+            <a:avLst/>
+          </a:prstGeom>
+          <a:solidFill>
+            <a:schemeClr val="bg1"/>
+          </a:solidFill>
+          <a:ln w="28575">
+            <a:solidFill>
+              <a:schemeClr val="accent6"/>
+            </a:solidFill>
+          </a:ln>
+        </p:spPr>
+        <p:txBody>
+          <a:bodyPr wrap="none" rtlCol="0">
+            <a:spAutoFit/>
+          </a:bodyPr>
+          <a:lstStyle/>
+          <a:p>
+            <a:r>
+              <a:rPr lang="ko-KR" altLang="en-US" dirty="0"/>
+              <a:t>그룹 내 편차</a:t>
+            </a:r>
+          </a:p>
+        </p:txBody>
+      </p:sp>
+      <p:cxnSp>
+        <p:nvCxnSpPr>
+          <p:cNvPr id="18" name="직선 화살표 연결선 17">
+            <a:extLst>
+              <a:ext uri="{FF2B5EF4-FFF2-40B4-BE49-F238E27FC236}">
+                <a16:creationId xmlns:a16="http://schemas.microsoft.com/office/drawing/2014/main" id="{508D13AE-9E45-4C0D-8632-2FEC40FC8CE5}"/>
+              </a:ext>
+            </a:extLst>
+          </p:cNvPr>
+          <p:cNvCxnSpPr>
+            <a:cxnSpLocks/>
+            <a:endCxn id="5" idx="0"/>
+          </p:cNvCxnSpPr>
+          <p:nvPr/>
+        </p:nvCxnSpPr>
+        <p:spPr>
+          <a:xfrm flipH="1">
+            <a:off x="2518681" y="3121202"/>
+            <a:ext cx="1245451" cy="615596"/>
+          </a:xfrm>
+          <a:prstGeom prst="straightConnector1">
+            <a:avLst/>
+          </a:prstGeom>
+          <a:ln w="38100">
+            <a:solidFill>
+              <a:schemeClr val="tx1"/>
+            </a:solidFill>
+            <a:prstDash val="sysDot"/>
+            <a:tailEnd type="triangle"/>
+          </a:ln>
+        </p:spPr>
+        <p:style>
+          <a:lnRef idx="1">
+            <a:schemeClr val="accent1"/>
+          </a:lnRef>
+          <a:fillRef idx="0">
+            <a:schemeClr val="accent1"/>
+          </a:fillRef>
+          <a:effectRef idx="0">
+            <a:schemeClr val="accent1"/>
+          </a:effectRef>
+          <a:fontRef idx="minor">
+            <a:schemeClr val="tx1"/>
+          </a:fontRef>
+        </p:style>
+      </p:cxnSp>
+      <p:cxnSp>
+        <p:nvCxnSpPr>
+          <p:cNvPr id="20" name="직선 화살표 연결선 19">
+            <a:extLst>
+              <a:ext uri="{FF2B5EF4-FFF2-40B4-BE49-F238E27FC236}">
+                <a16:creationId xmlns:a16="http://schemas.microsoft.com/office/drawing/2014/main" id="{618E11F5-19C7-4190-B85F-D91840FA31A5}"/>
+              </a:ext>
+            </a:extLst>
+          </p:cNvPr>
+          <p:cNvCxnSpPr>
+            <a:cxnSpLocks/>
+          </p:cNvCxnSpPr>
+          <p:nvPr/>
+        </p:nvCxnSpPr>
+        <p:spPr>
+          <a:xfrm>
+            <a:off x="5505300" y="3121202"/>
+            <a:ext cx="1245451" cy="615596"/>
+          </a:xfrm>
+          <a:prstGeom prst="straightConnector1">
+            <a:avLst/>
+          </a:prstGeom>
+          <a:ln w="38100">
+            <a:solidFill>
+              <a:schemeClr val="tx1"/>
+            </a:solidFill>
+            <a:prstDash val="sysDot"/>
+            <a:tailEnd type="triangle"/>
+          </a:ln>
+        </p:spPr>
+        <p:style>
+          <a:lnRef idx="1">
+            <a:schemeClr val="accent1"/>
+          </a:lnRef>
+          <a:fillRef idx="0">
+            <a:schemeClr val="accent1"/>
+          </a:fillRef>
+          <a:effectRef idx="0">
+            <a:schemeClr val="accent1"/>
+          </a:effectRef>
+          <a:fontRef idx="minor">
+            <a:schemeClr val="tx1"/>
+          </a:fontRef>
+        </p:style>
+      </p:cxnSp>
+      <p:sp>
+        <p:nvSpPr>
+          <p:cNvPr id="21" name="TextBox 20">
+            <a:extLst>
+              <a:ext uri="{FF2B5EF4-FFF2-40B4-BE49-F238E27FC236}">
+                <a16:creationId xmlns:a16="http://schemas.microsoft.com/office/drawing/2014/main" id="{59D4F689-1FE9-42D7-A8A3-D3E755CDD410}"/>
+              </a:ext>
+            </a:extLst>
+          </p:cNvPr>
+          <p:cNvSpPr txBox="1"/>
+          <p:nvPr/>
+        </p:nvSpPr>
+        <p:spPr>
+          <a:xfrm>
+            <a:off x="1698458" y="753085"/>
+            <a:ext cx="5747087" cy="461665"/>
+          </a:xfrm>
+          <a:prstGeom prst="rect">
+            <a:avLst/>
+          </a:prstGeom>
+          <a:solidFill>
+            <a:schemeClr val="bg1"/>
+          </a:solidFill>
+          <a:ln w="12700">
+            <a:solidFill>
+              <a:schemeClr val="tx1"/>
+            </a:solidFill>
+          </a:ln>
+        </p:spPr>
+        <p:txBody>
+          <a:bodyPr wrap="none" rtlCol="0">
+            <a:spAutoFit/>
+          </a:bodyPr>
+          <a:lstStyle/>
+          <a:p>
+            <a:pPr algn="ctr"/>
+            <a:r>
+              <a:rPr lang="ko-KR" altLang="en-US" sz="2400" b="1" dirty="0"/>
+              <a:t>두 그룹의 차이가 커질 수 있는 </a:t>
+            </a:r>
+            <a:r>
+              <a:rPr lang="ko-KR" altLang="en-US" sz="2400" b="1"/>
+              <a:t>조건 </a:t>
+            </a:r>
+            <a:r>
+              <a:rPr lang="en-US" altLang="ko-KR" sz="2400" b="1" dirty="0"/>
+              <a:t>2</a:t>
+            </a:r>
+            <a:r>
+              <a:rPr lang="ko-KR" altLang="en-US" sz="2400" b="1" dirty="0"/>
+              <a:t>가지</a:t>
+            </a:r>
+          </a:p>
+        </p:txBody>
+      </p:sp>
+      <p:sp>
+        <p:nvSpPr>
+          <p:cNvPr id="22" name="TextBox 21">
+            <a:extLst>
+              <a:ext uri="{FF2B5EF4-FFF2-40B4-BE49-F238E27FC236}">
+                <a16:creationId xmlns:a16="http://schemas.microsoft.com/office/drawing/2014/main" id="{419F8496-4F48-421A-BBD1-D174B9DB0F07}"/>
+              </a:ext>
+            </a:extLst>
+          </p:cNvPr>
+          <p:cNvSpPr txBox="1"/>
+          <p:nvPr/>
+        </p:nvSpPr>
+        <p:spPr>
+          <a:xfrm>
+            <a:off x="2901211" y="3081569"/>
+            <a:ext cx="415498" cy="369332"/>
+          </a:xfrm>
+          <a:prstGeom prst="rect">
+            <a:avLst/>
+          </a:prstGeom>
+          <a:noFill/>
+        </p:spPr>
+        <p:txBody>
+          <a:bodyPr wrap="none" rtlCol="0">
+            <a:spAutoFit/>
+          </a:bodyPr>
+          <a:lstStyle/>
+          <a:p>
+            <a:r>
+              <a:rPr lang="ko-KR" altLang="en-US" dirty="0"/>
+              <a:t>①</a:t>
+            </a:r>
+          </a:p>
+        </p:txBody>
+      </p:sp>
+      <p:sp>
+        <p:nvSpPr>
+          <p:cNvPr id="23" name="TextBox 22">
+            <a:extLst>
+              <a:ext uri="{FF2B5EF4-FFF2-40B4-BE49-F238E27FC236}">
+                <a16:creationId xmlns:a16="http://schemas.microsoft.com/office/drawing/2014/main" id="{8AFA7BEA-E017-47C8-BA50-44A6595E598E}"/>
+              </a:ext>
+            </a:extLst>
+          </p:cNvPr>
+          <p:cNvSpPr txBox="1"/>
+          <p:nvPr/>
+        </p:nvSpPr>
+        <p:spPr>
+          <a:xfrm>
+            <a:off x="5920276" y="3081569"/>
+            <a:ext cx="415498" cy="369332"/>
+          </a:xfrm>
+          <a:prstGeom prst="rect">
+            <a:avLst/>
+          </a:prstGeom>
+          <a:noFill/>
+        </p:spPr>
+        <p:txBody>
+          <a:bodyPr wrap="none" rtlCol="0">
+            <a:spAutoFit/>
+          </a:bodyPr>
+          <a:lstStyle/>
+          <a:p>
+            <a:r>
+              <a:rPr lang="ko-KR" altLang="en-US" dirty="0"/>
+              <a:t>②</a:t>
+            </a:r>
+          </a:p>
+        </p:txBody>
+      </p:sp>
+      <p:sp>
+        <p:nvSpPr>
+          <p:cNvPr id="24" name="TextBox 23">
+            <a:extLst>
+              <a:ext uri="{FF2B5EF4-FFF2-40B4-BE49-F238E27FC236}">
+                <a16:creationId xmlns:a16="http://schemas.microsoft.com/office/drawing/2014/main" id="{BE431D9F-7AA8-4DB3-B964-F2F4E56EDF21}"/>
+              </a:ext>
+            </a:extLst>
+          </p:cNvPr>
+          <p:cNvSpPr txBox="1"/>
+          <p:nvPr/>
+        </p:nvSpPr>
+        <p:spPr>
+          <a:xfrm>
+            <a:off x="1269507" y="5584054"/>
+            <a:ext cx="2651688" cy="369332"/>
+          </a:xfrm>
+          <a:prstGeom prst="rect">
+            <a:avLst/>
+          </a:prstGeom>
+          <a:noFill/>
+          <a:ln>
+            <a:solidFill>
+              <a:schemeClr val="tx1"/>
+            </a:solidFill>
+          </a:ln>
+        </p:spPr>
+        <p:txBody>
+          <a:bodyPr wrap="none" rtlCol="0">
+            <a:spAutoFit/>
+          </a:bodyPr>
+          <a:lstStyle/>
+          <a:p>
+            <a:pPr algn="ctr"/>
+            <a:r>
+              <a:rPr lang="ko-KR" altLang="en-US" dirty="0"/>
+              <a:t>그룹 간 </a:t>
+            </a:r>
+            <a:r>
+              <a:rPr lang="ko-KR" altLang="en-US"/>
+              <a:t>편차가 커지거나</a:t>
+            </a:r>
+          </a:p>
+        </p:txBody>
+      </p:sp>
+      <p:sp>
+        <p:nvSpPr>
+          <p:cNvPr id="25" name="TextBox 24">
+            <a:extLst>
+              <a:ext uri="{FF2B5EF4-FFF2-40B4-BE49-F238E27FC236}">
+                <a16:creationId xmlns:a16="http://schemas.microsoft.com/office/drawing/2014/main" id="{565EBCC9-1EA2-4DDC-983F-E2DF88FF74E7}"/>
+              </a:ext>
+            </a:extLst>
+          </p:cNvPr>
+          <p:cNvSpPr txBox="1"/>
+          <p:nvPr/>
+        </p:nvSpPr>
+        <p:spPr>
+          <a:xfrm>
+            <a:off x="5256227" y="5584054"/>
+            <a:ext cx="2882520" cy="369332"/>
+          </a:xfrm>
+          <a:prstGeom prst="rect">
+            <a:avLst/>
+          </a:prstGeom>
+          <a:noFill/>
+          <a:ln>
+            <a:solidFill>
+              <a:schemeClr val="tx1"/>
+            </a:solidFill>
+          </a:ln>
+        </p:spPr>
+        <p:txBody>
+          <a:bodyPr wrap="none" rtlCol="0">
+            <a:spAutoFit/>
+          </a:bodyPr>
+          <a:lstStyle/>
+          <a:p>
+            <a:pPr algn="ctr"/>
+            <a:r>
+              <a:rPr lang="ko-KR" altLang="en-US" dirty="0"/>
+              <a:t>그룹 내 편차가 작아지거나</a:t>
+            </a:r>
+          </a:p>
+        </p:txBody>
+      </p:sp>
+    </p:spTree>
+    <p:extLst>
+      <p:ext uri="{BB962C8B-B14F-4D97-AF65-F5344CB8AC3E}">
+        <p14:creationId xmlns:p14="http://schemas.microsoft.com/office/powerpoint/2010/main" val="336787224"/>
+      </p:ext>
+    </p:extLst>
+  </p:cSld>
+  <p:clrMapOvr>
+    <a:masterClrMapping/>
+  </p:clrMapOvr>
+</p:sld>
+</file>
+
 <file path=ppt/theme/theme1.xml><?xml version="1.0" encoding="utf-8"?>
 <a:theme xmlns:a="http://schemas.openxmlformats.org/drawingml/2006/main" name="Office 테마">
   <a:themeElements>

</xml_diff>